<commit_message>
Added all code and lec
</commit_message>
<xml_diff>
--- a/slides/Lec2.pptx
+++ b/slides/Lec2.pptx
@@ -304,7 +304,7 @@
       </p15:sldGuideLst>
     </p:ext>
     <p:ext uri="http://customooxmlschemas.google.com/">
-      <go:slidesCustomData xmlns:go="http://customooxmlschemas.google.com/" xmlns:ahyp="http://schemas.microsoft.com/office/drawing/2018/hyperlinkcolor" xmlns:p15="http://schemas.microsoft.com/office/powerpoint/2012/main" xmlns:p14="http://schemas.microsoft.com/office/powerpoint/2010/main" xmlns:com="http://schemas.openxmlformats.org/drawingml/2006/compatibility" xmlns:pvml="urn:schemas-microsoft-com:office:powerpoint" xmlns:v="urn:schemas-microsoft-com:vml" xmlns:o="urn:schemas-microsoft-com:office:office" xmlns:dgm="http://schemas.openxmlformats.org/drawingml/2006/diagram" xmlns:c="http://schemas.openxmlformats.org/drawingml/2006/chart" xmlns:mv="urn:schemas-microsoft-com:mac:vml" xmlns:mc="http://schemas.openxmlformats.org/markup-compatibility/2006" xmlns="" r:id="rId56" roundtripDataSignature="AMtx7mhLjqUDAGIZvqPq2LhdpUmIrXCQvQ=="/>
+      <go:slidesCustomData xmlns="" xmlns:mc="http://schemas.openxmlformats.org/markup-compatibility/2006" xmlns:mv="urn:schemas-microsoft-com:mac:vml" xmlns:c="http://schemas.openxmlformats.org/drawingml/2006/chart" xmlns:dgm="http://schemas.openxmlformats.org/drawingml/2006/diagram" xmlns:o="urn:schemas-microsoft-com:office:office" xmlns:v="urn:schemas-microsoft-com:vml" xmlns:pvml="urn:schemas-microsoft-com:office:powerpoint" xmlns:com="http://schemas.openxmlformats.org/drawingml/2006/compatibility" xmlns:p14="http://schemas.microsoft.com/office/powerpoint/2010/main" xmlns:p15="http://schemas.microsoft.com/office/powerpoint/2012/main" xmlns:ahyp="http://schemas.microsoft.com/office/drawing/2018/hyperlinkcolor" xmlns:go="http://customooxmlschemas.google.com/" r:id="rId56" roundtripDataSignature="AMtx7mhLjqUDAGIZvqPq2LhdpUmIrXCQvQ=="/>
     </p:ext>
   </p:extLst>
 </p:presentation>
@@ -41078,7 +41078,7 @@
               <a:buFont typeface="Arial"/>
               <a:buNone/>
             </a:pPr>
-            <a:endParaRPr sz="1800" b="0" i="0" u="none" strike="noStrike" cap="none">
+            <a:endParaRPr sz="1800" b="0" i="0" u="none" strike="noStrike" cap="none" dirty="0">
               <a:solidFill>
                 <a:srgbClr val="000000"/>
               </a:solidFill>
@@ -41107,7 +41107,7 @@
               <a:buAutoNum type="arabicPeriod"/>
             </a:pPr>
             <a:r>
-              <a:rPr lang="en-US" sz="1800" b="0" i="0" u="none" strike="noStrike" cap="none">
+              <a:rPr lang="en-US" sz="1800" b="0" i="0" u="none" strike="noStrike" cap="none" dirty="0">
                 <a:solidFill>
                   <a:srgbClr val="000000"/>
                 </a:solidFill>
@@ -41118,7 +41118,7 @@
               </a:rPr>
               <a:t>Write a program  to print all the alphabets using a pointer.</a:t>
             </a:r>
-            <a:endParaRPr sz="1400" b="0" i="0" u="none" strike="noStrike" cap="none">
+            <a:endParaRPr sz="1400" b="0" i="0" u="none" strike="noStrike" cap="none" dirty="0">
               <a:solidFill>
                 <a:srgbClr val="000000"/>
               </a:solidFill>
@@ -41129,6 +41129,59 @@
             </a:endParaRPr>
           </a:p>
           <a:p>
+            <a:pPr marR="0" lvl="0" algn="l" rtl="0">
+              <a:lnSpc>
+                <a:spcPct val="100000"/>
+              </a:lnSpc>
+              <a:spcBef>
+                <a:spcPts val="0"/>
+              </a:spcBef>
+              <a:spcAft>
+                <a:spcPts val="0"/>
+              </a:spcAft>
+              <a:buClr>
+                <a:srgbClr val="000000"/>
+              </a:buClr>
+              <a:buSzPts val="1800"/>
+            </a:pPr>
+            <a:endParaRPr lang="en-US" sz="1800" dirty="0">
+              <a:latin typeface="Calibri"/>
+              <a:ea typeface="Calibri"/>
+              <a:cs typeface="Calibri"/>
+              <a:sym typeface="Calibri"/>
+            </a:endParaRPr>
+          </a:p>
+          <a:p>
+            <a:pPr marR="0" lvl="0" algn="l" rtl="0">
+              <a:lnSpc>
+                <a:spcPct val="100000"/>
+              </a:lnSpc>
+              <a:spcBef>
+                <a:spcPts val="0"/>
+              </a:spcBef>
+              <a:spcAft>
+                <a:spcPts val="0"/>
+              </a:spcAft>
+              <a:buClr>
+                <a:srgbClr val="000000"/>
+              </a:buClr>
+              <a:buSzPts val="1800"/>
+            </a:pPr>
+            <a:r>
+              <a:rPr lang="en-US" sz="1800" b="0" i="0" u="none" strike="noStrike" cap="none" dirty="0">
+                <a:solidFill>
+                  <a:srgbClr val="000000"/>
+                </a:solidFill>
+                <a:latin typeface="Calibri"/>
+                <a:ea typeface="Calibri"/>
+                <a:cs typeface="Calibri"/>
+                <a:sym typeface="Calibri"/>
+              </a:rPr>
+              <a:t>2.    Write a program to print the elements of an array in reverse order using pointer.</a:t>
+            </a:r>
+            <a:endParaRPr dirty="0"/>
+          </a:p>
+          <a:p>
             <a:pPr marL="342900" marR="0" lvl="0" indent="-228600" algn="l" rtl="0">
               <a:lnSpc>
                 <a:spcPct val="100000"/>
@@ -41146,18 +41199,18 @@
               <a:buFont typeface="Arial"/>
               <a:buNone/>
             </a:pPr>
-            <a:endParaRPr sz="1800" b="0" i="0" u="none" strike="noStrike" cap="none">
-              <a:solidFill>
-                <a:srgbClr val="000000"/>
-              </a:solidFill>
-              <a:latin typeface="Calibri"/>
-              <a:ea typeface="Calibri"/>
-              <a:cs typeface="Calibri"/>
-              <a:sym typeface="Calibri"/>
-            </a:endParaRPr>
-          </a:p>
-          <a:p>
-            <a:pPr marL="342900" marR="0" lvl="0" indent="-342900" algn="l" rtl="0">
+            <a:endParaRPr sz="1800" b="0" i="0" u="none" strike="noStrike" cap="none" dirty="0">
+              <a:solidFill>
+                <a:srgbClr val="000000"/>
+              </a:solidFill>
+              <a:latin typeface="Calibri"/>
+              <a:ea typeface="Calibri"/>
+              <a:cs typeface="Calibri"/>
+              <a:sym typeface="Calibri"/>
+            </a:endParaRPr>
+          </a:p>
+          <a:p>
+            <a:pPr marR="0" lvl="0" algn="l" rtl="0">
               <a:lnSpc>
                 <a:spcPct val="100000"/>
               </a:lnSpc>
@@ -41171,37 +41224,23 @@
                 <a:srgbClr val="000000"/>
               </a:buClr>
               <a:buSzPts val="1800"/>
-              <a:buFont typeface="Arial"/>
-              <a:buAutoNum type="arabicPeriod"/>
             </a:pPr>
             <a:r>
-              <a:rPr lang="en-US" sz="1800" b="1" i="0" u="none" strike="noStrike" cap="none">
-                <a:solidFill>
-                  <a:srgbClr val="000000"/>
-                </a:solidFill>
-                <a:latin typeface="Calibri"/>
-                <a:ea typeface="Calibri"/>
-                <a:cs typeface="Calibri"/>
-                <a:sym typeface="Calibri"/>
-              </a:rPr>
-              <a:t> </a:t>
+              <a:rPr lang="en-US" sz="1800" b="0" i="0" u="none" strike="noStrike" cap="none" dirty="0">
+                <a:solidFill>
+                  <a:srgbClr val="000000"/>
+                </a:solidFill>
+                <a:latin typeface="Calibri"/>
+                <a:ea typeface="Calibri"/>
+                <a:cs typeface="Calibri"/>
+                <a:sym typeface="Calibri"/>
+              </a:rPr>
+              <a:t>3.    Write a program  to count the number of vowels and consonants in a string using a pointer.</a:t>
             </a:r>
-            <a:r>
-              <a:rPr lang="en-US" sz="1800" b="0" i="0" u="none" strike="noStrike" cap="none">
-                <a:solidFill>
-                  <a:srgbClr val="000000"/>
-                </a:solidFill>
-                <a:latin typeface="Calibri"/>
-                <a:ea typeface="Calibri"/>
-                <a:cs typeface="Calibri"/>
-                <a:sym typeface="Calibri"/>
-              </a:rPr>
-              <a:t>Write a program to print the elements of an array in reverse order using pointer.</a:t>
-            </a:r>
-            <a:endParaRPr/>
-          </a:p>
-          <a:p>
-            <a:pPr marL="342900" marR="0" lvl="0" indent="-228600" algn="l" rtl="0">
+            <a:endParaRPr dirty="0"/>
+          </a:p>
+          <a:p>
+            <a:pPr marR="0" lvl="0" algn="l" rtl="0">
               <a:lnSpc>
                 <a:spcPct val="100000"/>
               </a:lnSpc>
@@ -41215,21 +41254,16 @@
                 <a:srgbClr val="000000"/>
               </a:buClr>
               <a:buSzPts val="1800"/>
-              <a:buFont typeface="Arial"/>
-              <a:buNone/>
-            </a:pPr>
-            <a:endParaRPr sz="1800" b="0" i="0" u="none" strike="noStrike" cap="none">
-              <a:solidFill>
-                <a:srgbClr val="000000"/>
-              </a:solidFill>
-              <a:latin typeface="Calibri"/>
-              <a:ea typeface="Calibri"/>
-              <a:cs typeface="Calibri"/>
-              <a:sym typeface="Calibri"/>
-            </a:endParaRPr>
-          </a:p>
-          <a:p>
-            <a:pPr marL="342900" marR="0" lvl="0" indent="-342900" algn="l" rtl="0">
+            </a:pPr>
+            <a:endParaRPr lang="en-US" sz="1800" dirty="0">
+              <a:latin typeface="Calibri"/>
+              <a:ea typeface="Calibri"/>
+              <a:cs typeface="Calibri"/>
+              <a:sym typeface="Calibri"/>
+            </a:endParaRPr>
+          </a:p>
+          <a:p>
+            <a:pPr marR="0" lvl="0" algn="l" rtl="0">
               <a:lnSpc>
                 <a:spcPct val="100000"/>
               </a:lnSpc>
@@ -41243,82 +41277,20 @@
                 <a:srgbClr val="000000"/>
               </a:buClr>
               <a:buSzPts val="1800"/>
-              <a:buFont typeface="Arial"/>
-              <a:buAutoNum type="arabicPeriod"/>
             </a:pPr>
             <a:r>
-              <a:rPr lang="en-US" sz="1800" b="0" i="0" u="none" strike="noStrike" cap="none">
-                <a:solidFill>
-                  <a:srgbClr val="000000"/>
-                </a:solidFill>
-                <a:latin typeface="Calibri"/>
-                <a:ea typeface="Calibri"/>
-                <a:cs typeface="Calibri"/>
-                <a:sym typeface="Calibri"/>
-              </a:rPr>
-              <a:t>Write a program  to count the number of vowels and consonants in a string using a pointer.</a:t>
+              <a:rPr lang="en-US" sz="1800" b="0" i="0" u="none" strike="noStrike" cap="none" dirty="0">
+                <a:solidFill>
+                  <a:srgbClr val="000000"/>
+                </a:solidFill>
+                <a:latin typeface="Calibri"/>
+                <a:ea typeface="Calibri"/>
+                <a:cs typeface="Calibri"/>
+                <a:sym typeface="Calibri"/>
+              </a:rPr>
+              <a:t>4.    Write a program to find the maximum number between three numbers using a pointer.</a:t>
             </a:r>
-            <a:endParaRPr/>
-          </a:p>
-          <a:p>
-            <a:pPr marL="342900" marR="0" lvl="0" indent="-228600" algn="l" rtl="0">
-              <a:lnSpc>
-                <a:spcPct val="100000"/>
-              </a:lnSpc>
-              <a:spcBef>
-                <a:spcPts val="0"/>
-              </a:spcBef>
-              <a:spcAft>
-                <a:spcPts val="0"/>
-              </a:spcAft>
-              <a:buClr>
-                <a:srgbClr val="000000"/>
-              </a:buClr>
-              <a:buSzPts val="1800"/>
-              <a:buFont typeface="Arial"/>
-              <a:buNone/>
-            </a:pPr>
-            <a:endParaRPr sz="1800" b="0" i="0" u="none" strike="noStrike" cap="none">
-              <a:solidFill>
-                <a:srgbClr val="000000"/>
-              </a:solidFill>
-              <a:latin typeface="Calibri"/>
-              <a:ea typeface="Calibri"/>
-              <a:cs typeface="Calibri"/>
-              <a:sym typeface="Calibri"/>
-            </a:endParaRPr>
-          </a:p>
-          <a:p>
-            <a:pPr marL="342900" marR="0" lvl="0" indent="-342900" algn="l" rtl="0">
-              <a:lnSpc>
-                <a:spcPct val="100000"/>
-              </a:lnSpc>
-              <a:spcBef>
-                <a:spcPts val="0"/>
-              </a:spcBef>
-              <a:spcAft>
-                <a:spcPts val="0"/>
-              </a:spcAft>
-              <a:buClr>
-                <a:srgbClr val="000000"/>
-              </a:buClr>
-              <a:buSzPts val="1800"/>
-              <a:buFont typeface="Arial"/>
-              <a:buAutoNum type="arabicPeriod"/>
-            </a:pPr>
-            <a:r>
-              <a:rPr lang="en-US" sz="1800" b="0" i="0" u="none" strike="noStrike" cap="none">
-                <a:solidFill>
-                  <a:srgbClr val="000000"/>
-                </a:solidFill>
-                <a:latin typeface="Calibri"/>
-                <a:ea typeface="Calibri"/>
-                <a:cs typeface="Calibri"/>
-                <a:sym typeface="Calibri"/>
-              </a:rPr>
-              <a:t>Write a program to find the maximum number between three numbers using a pointer.</a:t>
-            </a:r>
-            <a:endParaRPr/>
+            <a:endParaRPr dirty="0"/>
           </a:p>
           <a:p>
             <a:pPr marL="0" marR="0" lvl="0" indent="0" algn="l" rtl="0">
@@ -41334,7 +41306,7 @@
               <a:buNone/>
             </a:pPr>
             <a:br>
-              <a:rPr lang="en-US" sz="1400" b="0" i="0" u="none" strike="noStrike" cap="none">
+              <a:rPr lang="en-US" sz="1400" b="0" i="0" u="none" strike="noStrike" cap="none" dirty="0">
                 <a:solidFill>
                   <a:srgbClr val="000000"/>
                 </a:solidFill>
@@ -41344,53 +41316,53 @@
                 <a:sym typeface="Arial"/>
               </a:rPr>
             </a:br>
-            <a:endParaRPr sz="1800" b="0" i="0" u="none" strike="noStrike" cap="none">
-              <a:solidFill>
-                <a:srgbClr val="000000"/>
-              </a:solidFill>
-              <a:latin typeface="Calibri"/>
-              <a:ea typeface="Calibri"/>
-              <a:cs typeface="Calibri"/>
-              <a:sym typeface="Calibri"/>
-            </a:endParaRPr>
-          </a:p>
-          <a:p>
-            <a:pPr marL="0" marR="0" lvl="0" indent="0" algn="l" rtl="0">
-              <a:lnSpc>
-                <a:spcPct val="100000"/>
-              </a:lnSpc>
-              <a:spcBef>
-                <a:spcPts val="0"/>
-              </a:spcBef>
-              <a:spcAft>
-                <a:spcPts val="0"/>
-              </a:spcAft>
-              <a:buNone/>
-            </a:pPr>
-            <a:endParaRPr sz="1800" b="0" i="0" u="none" strike="noStrike" cap="none">
-              <a:solidFill>
-                <a:srgbClr val="000000"/>
-              </a:solidFill>
-              <a:latin typeface="Calibri"/>
-              <a:ea typeface="Calibri"/>
-              <a:cs typeface="Calibri"/>
-              <a:sym typeface="Calibri"/>
-            </a:endParaRPr>
-          </a:p>
-          <a:p>
-            <a:pPr marL="0" marR="0" lvl="0" indent="0" algn="l" rtl="0">
-              <a:lnSpc>
-                <a:spcPct val="100000"/>
-              </a:lnSpc>
-              <a:spcBef>
-                <a:spcPts val="0"/>
-              </a:spcBef>
-              <a:spcAft>
-                <a:spcPts val="0"/>
-              </a:spcAft>
-              <a:buNone/>
-            </a:pPr>
-            <a:endParaRPr sz="1800" b="0" i="0" u="none" strike="noStrike" cap="none">
+            <a:endParaRPr sz="1800" b="0" i="0" u="none" strike="noStrike" cap="none" dirty="0">
+              <a:solidFill>
+                <a:srgbClr val="000000"/>
+              </a:solidFill>
+              <a:latin typeface="Calibri"/>
+              <a:ea typeface="Calibri"/>
+              <a:cs typeface="Calibri"/>
+              <a:sym typeface="Calibri"/>
+            </a:endParaRPr>
+          </a:p>
+          <a:p>
+            <a:pPr marL="0" marR="0" lvl="0" indent="0" algn="l" rtl="0">
+              <a:lnSpc>
+                <a:spcPct val="100000"/>
+              </a:lnSpc>
+              <a:spcBef>
+                <a:spcPts val="0"/>
+              </a:spcBef>
+              <a:spcAft>
+                <a:spcPts val="0"/>
+              </a:spcAft>
+              <a:buNone/>
+            </a:pPr>
+            <a:endParaRPr sz="1800" b="0" i="0" u="none" strike="noStrike" cap="none" dirty="0">
+              <a:solidFill>
+                <a:srgbClr val="000000"/>
+              </a:solidFill>
+              <a:latin typeface="Calibri"/>
+              <a:ea typeface="Calibri"/>
+              <a:cs typeface="Calibri"/>
+              <a:sym typeface="Calibri"/>
+            </a:endParaRPr>
+          </a:p>
+          <a:p>
+            <a:pPr marL="0" marR="0" lvl="0" indent="0" algn="l" rtl="0">
+              <a:lnSpc>
+                <a:spcPct val="100000"/>
+              </a:lnSpc>
+              <a:spcBef>
+                <a:spcPts val="0"/>
+              </a:spcBef>
+              <a:spcAft>
+                <a:spcPts val="0"/>
+              </a:spcAft>
+              <a:buNone/>
+            </a:pPr>
+            <a:endParaRPr sz="1800" b="0" i="0" u="none" strike="noStrike" cap="none" dirty="0">
               <a:solidFill>
                 <a:srgbClr val="000000"/>
               </a:solidFill>
@@ -41414,7 +41386,7 @@
               <a:buNone/>
             </a:pPr>
             <a:br>
-              <a:rPr lang="en-US" sz="1400" b="0" i="0" u="none" strike="noStrike" cap="none">
+              <a:rPr lang="en-US" sz="1400" b="0" i="0" u="none" strike="noStrike" cap="none" dirty="0">
                 <a:solidFill>
                   <a:srgbClr val="000000"/>
                 </a:solidFill>
@@ -41424,7 +41396,7 @@
                 <a:sym typeface="Arial"/>
               </a:rPr>
             </a:br>
-            <a:endParaRPr sz="1800" b="0" i="0" u="none" strike="noStrike" cap="none">
+            <a:endParaRPr sz="1800" b="0" i="0" u="none" strike="noStrike" cap="none" dirty="0">
               <a:solidFill>
                 <a:srgbClr val="000000"/>
               </a:solidFill>
@@ -41448,7 +41420,7 @@
               <a:buNone/>
             </a:pPr>
             <a:br>
-              <a:rPr lang="en-US" sz="1400" b="0" i="0" u="none" strike="noStrike" cap="none">
+              <a:rPr lang="en-US" sz="1400" b="0" i="0" u="none" strike="noStrike" cap="none" dirty="0">
                 <a:solidFill>
                   <a:srgbClr val="000000"/>
                 </a:solidFill>
@@ -41459,7 +41431,7 @@
               </a:rPr>
             </a:br>
             <a:br>
-              <a:rPr lang="en-US" sz="1400" b="0" i="0" u="none" strike="noStrike" cap="none">
+              <a:rPr lang="en-US" sz="1400" b="0" i="0" u="none" strike="noStrike" cap="none" dirty="0">
                 <a:solidFill>
                   <a:srgbClr val="000000"/>
                 </a:solidFill>
@@ -41469,7 +41441,7 @@
                 <a:sym typeface="Arial"/>
               </a:rPr>
             </a:br>
-            <a:endParaRPr sz="1800" b="0" i="0" u="none" strike="noStrike" cap="none">
+            <a:endParaRPr sz="1800" b="0" i="0" u="none" strike="noStrike" cap="none" dirty="0">
               <a:solidFill>
                 <a:srgbClr val="000000"/>
               </a:solidFill>
@@ -41493,7 +41465,7 @@
               <a:buNone/>
             </a:pPr>
             <a:r>
-              <a:rPr lang="en-US" sz="1800" b="0" i="0" u="none" strike="noStrike" cap="none">
+              <a:rPr lang="en-US" sz="1800" b="0" i="0" u="none" strike="noStrike" cap="none" dirty="0">
                 <a:solidFill>
                   <a:srgbClr val="000000"/>
                 </a:solidFill>
@@ -41505,7 +41477,7 @@
               <a:t>  </a:t>
             </a:r>
             <a:br>
-              <a:rPr lang="en-US" sz="1800" b="0" i="0" u="none" strike="noStrike" cap="none">
+              <a:rPr lang="en-US" sz="1800" b="0" i="0" u="none" strike="noStrike" cap="none" dirty="0">
                 <a:solidFill>
                   <a:srgbClr val="000000"/>
                 </a:solidFill>
@@ -41516,7 +41488,7 @@
               </a:rPr>
             </a:br>
             <a:br>
-              <a:rPr lang="en-US" sz="1800" b="0" i="0" u="none" strike="noStrike" cap="none">
+              <a:rPr lang="en-US" sz="1800" b="0" i="0" u="none" strike="noStrike" cap="none" dirty="0">
                 <a:solidFill>
                   <a:srgbClr val="000000"/>
                 </a:solidFill>
@@ -41526,7 +41498,7 @@
                 <a:sym typeface="Calibri"/>
               </a:rPr>
             </a:br>
-            <a:endParaRPr sz="1800" b="0" i="0" u="none" strike="noStrike" cap="none">
+            <a:endParaRPr sz="1800" b="0" i="0" u="none" strike="noStrike" cap="none" dirty="0">
               <a:solidFill>
                 <a:srgbClr val="000000"/>
               </a:solidFill>
@@ -41550,7 +41522,7 @@
               <a:buNone/>
             </a:pPr>
             <a:br>
-              <a:rPr lang="en-US" sz="1800" b="0" i="0" u="none" strike="noStrike" cap="none">
+              <a:rPr lang="en-US" sz="1800" b="0" i="0" u="none" strike="noStrike" cap="none" dirty="0">
                 <a:solidFill>
                   <a:srgbClr val="000000"/>
                 </a:solidFill>
@@ -41560,7 +41532,7 @@
                 <a:sym typeface="Arial"/>
               </a:rPr>
             </a:br>
-            <a:endParaRPr sz="1800" b="0" i="0" u="none" strike="noStrike" cap="none">
+            <a:endParaRPr sz="1800" b="0" i="0" u="none" strike="noStrike" cap="none" dirty="0">
               <a:solidFill>
                 <a:srgbClr val="000000"/>
               </a:solidFill>
@@ -41584,7 +41556,7 @@
               <a:buNone/>
             </a:pPr>
             <a:br>
-              <a:rPr lang="en-US" sz="1800" b="0" i="0" u="none" strike="noStrike" cap="none">
+              <a:rPr lang="en-US" sz="1800" b="0" i="0" u="none" strike="noStrike" cap="none" dirty="0">
                 <a:solidFill>
                   <a:srgbClr val="000000"/>
                 </a:solidFill>
@@ -41595,7 +41567,7 @@
               </a:rPr>
             </a:br>
             <a:br>
-              <a:rPr lang="en-US" sz="1800" b="0" i="0" u="none" strike="noStrike" cap="none">
+              <a:rPr lang="en-US" sz="1800" b="0" i="0" u="none" strike="noStrike" cap="none" dirty="0">
                 <a:solidFill>
                   <a:srgbClr val="000000"/>
                 </a:solidFill>
@@ -41605,30 +41577,30 @@
                 <a:sym typeface="Arial"/>
               </a:rPr>
             </a:br>
-            <a:endParaRPr sz="1800" b="0" i="0" u="none" strike="noStrike" cap="none">
-              <a:solidFill>
-                <a:srgbClr val="000000"/>
-              </a:solidFill>
-              <a:latin typeface="Calibri"/>
-              <a:ea typeface="Calibri"/>
-              <a:cs typeface="Calibri"/>
-              <a:sym typeface="Calibri"/>
-            </a:endParaRPr>
-          </a:p>
-          <a:p>
-            <a:pPr marL="0" marR="0" lvl="0" indent="0" algn="l" rtl="0">
-              <a:lnSpc>
-                <a:spcPct val="100000"/>
-              </a:lnSpc>
-              <a:spcBef>
-                <a:spcPts val="0"/>
-              </a:spcBef>
-              <a:spcAft>
-                <a:spcPts val="0"/>
-              </a:spcAft>
-              <a:buNone/>
-            </a:pPr>
-            <a:endParaRPr sz="1800" b="0" i="0" u="none" strike="noStrike" cap="none">
+            <a:endParaRPr sz="1800" b="0" i="0" u="none" strike="noStrike" cap="none" dirty="0">
+              <a:solidFill>
+                <a:srgbClr val="000000"/>
+              </a:solidFill>
+              <a:latin typeface="Calibri"/>
+              <a:ea typeface="Calibri"/>
+              <a:cs typeface="Calibri"/>
+              <a:sym typeface="Calibri"/>
+            </a:endParaRPr>
+          </a:p>
+          <a:p>
+            <a:pPr marL="0" marR="0" lvl="0" indent="0" algn="l" rtl="0">
+              <a:lnSpc>
+                <a:spcPct val="100000"/>
+              </a:lnSpc>
+              <a:spcBef>
+                <a:spcPts val="0"/>
+              </a:spcBef>
+              <a:spcAft>
+                <a:spcPts val="0"/>
+              </a:spcAft>
+              <a:buNone/>
+            </a:pPr>
+            <a:endParaRPr sz="1800" b="0" i="0" u="none" strike="noStrike" cap="none" dirty="0">
               <a:solidFill>
                 <a:srgbClr val="000000"/>
               </a:solidFill>
@@ -41652,7 +41624,7 @@
               <a:buNone/>
             </a:pPr>
             <a:br>
-              <a:rPr lang="en-US" sz="1600" b="0" i="0" u="none" strike="noStrike" cap="none">
+              <a:rPr lang="en-US" sz="1600" b="0" i="0" u="none" strike="noStrike" cap="none" dirty="0">
                 <a:solidFill>
                   <a:srgbClr val="000000"/>
                 </a:solidFill>
@@ -41662,7 +41634,7 @@
                 <a:sym typeface="Calibri"/>
               </a:rPr>
             </a:br>
-            <a:endParaRPr sz="1800" b="0" i="0" u="none" strike="noStrike" cap="none">
+            <a:endParaRPr sz="1800" b="0" i="0" u="none" strike="noStrike" cap="none" dirty="0">
               <a:solidFill>
                 <a:srgbClr val="000000"/>
               </a:solidFill>
@@ -41686,7 +41658,7 @@
               <a:buNone/>
             </a:pPr>
             <a:br>
-              <a:rPr lang="en-US" sz="1600" b="0" i="0" u="none" strike="noStrike" cap="none">
+              <a:rPr lang="en-US" sz="1600" b="0" i="0" u="none" strike="noStrike" cap="none" dirty="0">
                 <a:solidFill>
                   <a:srgbClr val="000000"/>
                 </a:solidFill>
@@ -41696,7 +41668,7 @@
                 <a:sym typeface="Calibri"/>
               </a:rPr>
             </a:br>
-            <a:endParaRPr sz="1800" b="0" i="0" u="none" strike="noStrike" cap="none">
+            <a:endParaRPr sz="1800" b="0" i="0" u="none" strike="noStrike" cap="none" dirty="0">
               <a:solidFill>
                 <a:srgbClr val="000000"/>
               </a:solidFill>
@@ -41720,7 +41692,7 @@
               <a:buNone/>
             </a:pPr>
             <a:br>
-              <a:rPr lang="en-US" sz="1600" b="0" i="0" u="none" strike="noStrike" cap="none">
+              <a:rPr lang="en-US" sz="1600" b="0" i="0" u="none" strike="noStrike" cap="none" dirty="0">
                 <a:solidFill>
                   <a:srgbClr val="000000"/>
                 </a:solidFill>
@@ -41730,7 +41702,7 @@
                 <a:sym typeface="Calibri"/>
               </a:rPr>
             </a:br>
-            <a:endParaRPr sz="1800" b="0" i="0" u="none" strike="noStrike" cap="none">
+            <a:endParaRPr sz="1800" b="0" i="0" u="none" strike="noStrike" cap="none" dirty="0">
               <a:solidFill>
                 <a:srgbClr val="000000"/>
               </a:solidFill>
@@ -41754,7 +41726,7 @@
               <a:buNone/>
             </a:pPr>
             <a:br>
-              <a:rPr lang="en-US" sz="1600" b="0" i="0" u="none" strike="noStrike" cap="none">
+              <a:rPr lang="en-US" sz="1600" b="0" i="0" u="none" strike="noStrike" cap="none" dirty="0">
                 <a:solidFill>
                   <a:srgbClr val="000000"/>
                 </a:solidFill>
@@ -41764,7 +41736,7 @@
                 <a:sym typeface="Calibri"/>
               </a:rPr>
             </a:br>
-            <a:endParaRPr sz="1800" b="0" i="0" u="none" strike="noStrike" cap="none">
+            <a:endParaRPr sz="1800" b="0" i="0" u="none" strike="noStrike" cap="none" dirty="0">
               <a:solidFill>
                 <a:srgbClr val="000000"/>
               </a:solidFill>

</xml_diff>